<commit_message>
utilize spiff state support
</commit_message>
<xml_diff>
--- a/doc/sow.pptx
+++ b/doc/sow.pptx
@@ -245,7 +245,7 @@
           <a:p>
             <a:fld id="{736FABA4-5E72-4344-B066-0334D9268F11}" type="datetimeFigureOut">
               <a:rPr lang="en-US" smtClean="0"/>
-              <a:t>2/26/2019</a:t>
+              <a:t>3/11/2019</a:t>
             </a:fld>
             <a:endParaRPr lang="en-US"/>
           </a:p>
@@ -415,7 +415,7 @@
           <a:p>
             <a:fld id="{736FABA4-5E72-4344-B066-0334D9268F11}" type="datetimeFigureOut">
               <a:rPr lang="en-US" smtClean="0"/>
-              <a:t>2/26/2019</a:t>
+              <a:t>3/11/2019</a:t>
             </a:fld>
             <a:endParaRPr lang="en-US"/>
           </a:p>
@@ -595,7 +595,7 @@
           <a:p>
             <a:fld id="{736FABA4-5E72-4344-B066-0334D9268F11}" type="datetimeFigureOut">
               <a:rPr lang="en-US" smtClean="0"/>
-              <a:t>2/26/2019</a:t>
+              <a:t>3/11/2019</a:t>
             </a:fld>
             <a:endParaRPr lang="en-US"/>
           </a:p>
@@ -765,7 +765,7 @@
           <a:p>
             <a:fld id="{736FABA4-5E72-4344-B066-0334D9268F11}" type="datetimeFigureOut">
               <a:rPr lang="en-US" smtClean="0"/>
-              <a:t>2/26/2019</a:t>
+              <a:t>3/11/2019</a:t>
             </a:fld>
             <a:endParaRPr lang="en-US"/>
           </a:p>
@@ -1009,7 +1009,7 @@
           <a:p>
             <a:fld id="{736FABA4-5E72-4344-B066-0334D9268F11}" type="datetimeFigureOut">
               <a:rPr lang="en-US" smtClean="0"/>
-              <a:t>2/26/2019</a:t>
+              <a:t>3/11/2019</a:t>
             </a:fld>
             <a:endParaRPr lang="en-US"/>
           </a:p>
@@ -1241,7 +1241,7 @@
           <a:p>
             <a:fld id="{736FABA4-5E72-4344-B066-0334D9268F11}" type="datetimeFigureOut">
               <a:rPr lang="en-US" smtClean="0"/>
-              <a:t>2/26/2019</a:t>
+              <a:t>3/11/2019</a:t>
             </a:fld>
             <a:endParaRPr lang="en-US"/>
           </a:p>
@@ -1608,7 +1608,7 @@
           <a:p>
             <a:fld id="{736FABA4-5E72-4344-B066-0334D9268F11}" type="datetimeFigureOut">
               <a:rPr lang="en-US" smtClean="0"/>
-              <a:t>2/26/2019</a:t>
+              <a:t>3/11/2019</a:t>
             </a:fld>
             <a:endParaRPr lang="en-US"/>
           </a:p>
@@ -1726,7 +1726,7 @@
           <a:p>
             <a:fld id="{736FABA4-5E72-4344-B066-0334D9268F11}" type="datetimeFigureOut">
               <a:rPr lang="en-US" smtClean="0"/>
-              <a:t>2/26/2019</a:t>
+              <a:t>3/11/2019</a:t>
             </a:fld>
             <a:endParaRPr lang="en-US"/>
           </a:p>
@@ -1821,7 +1821,7 @@
           <a:p>
             <a:fld id="{736FABA4-5E72-4344-B066-0334D9268F11}" type="datetimeFigureOut">
               <a:rPr lang="en-US" smtClean="0"/>
-              <a:t>2/26/2019</a:t>
+              <a:t>3/11/2019</a:t>
             </a:fld>
             <a:endParaRPr lang="en-US"/>
           </a:p>
@@ -2098,7 +2098,7 @@
           <a:p>
             <a:fld id="{736FABA4-5E72-4344-B066-0334D9268F11}" type="datetimeFigureOut">
               <a:rPr lang="en-US" smtClean="0"/>
-              <a:t>2/26/2019</a:t>
+              <a:t>3/11/2019</a:t>
             </a:fld>
             <a:endParaRPr lang="en-US"/>
           </a:p>
@@ -2355,7 +2355,7 @@
           <a:p>
             <a:fld id="{736FABA4-5E72-4344-B066-0334D9268F11}" type="datetimeFigureOut">
               <a:rPr lang="en-US" smtClean="0"/>
-              <a:t>2/26/2019</a:t>
+              <a:t>3/11/2019</a:t>
             </a:fld>
             <a:endParaRPr lang="en-US"/>
           </a:p>
@@ -2568,7 +2568,7 @@
           <a:p>
             <a:fld id="{736FABA4-5E72-4344-B066-0334D9268F11}" type="datetimeFigureOut">
               <a:rPr lang="en-US" smtClean="0"/>
-              <a:t>2/26/2019</a:t>
+              <a:t>3/11/2019</a:t>
             </a:fld>
             <a:endParaRPr lang="en-US"/>
           </a:p>
@@ -2975,10 +2975,10 @@
       </p:grpSpPr>
       <p:grpSp>
         <p:nvGrpSpPr>
-          <p:cNvPr id="219" name="Group 218">
+          <p:cNvPr id="12" name="Group 11">
             <a:extLst>
               <a:ext uri="{FF2B5EF4-FFF2-40B4-BE49-F238E27FC236}">
-                <a16:creationId xmlns:a16="http://schemas.microsoft.com/office/drawing/2014/main" id="{0F4F31E5-AE5B-4851-BED6-586C4CB1DD31}"/>
+                <a16:creationId xmlns:a16="http://schemas.microsoft.com/office/drawing/2014/main" id="{638313BB-D841-4DC3-9EA4-793CE2E8BB06}"/>
               </a:ext>
             </a:extLst>
           </p:cNvPr>
@@ -3125,7 +3125,7 @@
           </p:nvSpPr>
           <p:spPr>
             <a:xfrm>
-              <a:off x="2744689" y="1647571"/>
+              <a:off x="2723423" y="1413657"/>
               <a:ext cx="8852965" cy="8938734"/>
             </a:xfrm>
             <a:prstGeom prst="roundRect">
@@ -3184,8 +3184,8 @@
           </p:nvSpPr>
           <p:spPr>
             <a:xfrm>
-              <a:off x="6559170" y="2211573"/>
-              <a:ext cx="3476850" cy="6666615"/>
+              <a:off x="6580435" y="3923415"/>
+              <a:ext cx="3455585" cy="4954773"/>
             </a:xfrm>
             <a:custGeom>
               <a:avLst/>
@@ -3482,6 +3482,236 @@
                 <a:gd name="connsiteY3" fmla="*/ 6347637 h 6666615"/>
                 <a:gd name="connsiteX4" fmla="*/ 2673450 w 2673450"/>
                 <a:gd name="connsiteY4" fmla="*/ 6666615 h 6666615"/>
+                <a:gd name="connsiteX0" fmla="*/ 0 w 2673450"/>
+                <a:gd name="connsiteY0" fmla="*/ 0 h 6666615"/>
+                <a:gd name="connsiteX1" fmla="*/ 8175 w 2673450"/>
+                <a:gd name="connsiteY1" fmla="*/ 5582092 h 6666615"/>
+                <a:gd name="connsiteX2" fmla="*/ 1535627 w 2673450"/>
+                <a:gd name="connsiteY2" fmla="*/ 5348178 h 6666615"/>
+                <a:gd name="connsiteX3" fmla="*/ 1537029 w 2673450"/>
+                <a:gd name="connsiteY3" fmla="*/ 6347637 h 6666615"/>
+                <a:gd name="connsiteX4" fmla="*/ 2673450 w 2673450"/>
+                <a:gd name="connsiteY4" fmla="*/ 6666615 h 6666615"/>
+                <a:gd name="connsiteX0" fmla="*/ 0 w 2673450"/>
+                <a:gd name="connsiteY0" fmla="*/ 0 h 6666615"/>
+                <a:gd name="connsiteX1" fmla="*/ 16351 w 2673450"/>
+                <a:gd name="connsiteY1" fmla="*/ 5348176 h 6666615"/>
+                <a:gd name="connsiteX2" fmla="*/ 1535627 w 2673450"/>
+                <a:gd name="connsiteY2" fmla="*/ 5348178 h 6666615"/>
+                <a:gd name="connsiteX3" fmla="*/ 1537029 w 2673450"/>
+                <a:gd name="connsiteY3" fmla="*/ 6347637 h 6666615"/>
+                <a:gd name="connsiteX4" fmla="*/ 2673450 w 2673450"/>
+                <a:gd name="connsiteY4" fmla="*/ 6666615 h 6666615"/>
+                <a:gd name="connsiteX0" fmla="*/ 0 w 2673450"/>
+                <a:gd name="connsiteY0" fmla="*/ 0 h 6666615"/>
+                <a:gd name="connsiteX1" fmla="*/ 16351 w 2673450"/>
+                <a:gd name="connsiteY1" fmla="*/ 5348176 h 6666615"/>
+                <a:gd name="connsiteX2" fmla="*/ 1535627 w 2673450"/>
+                <a:gd name="connsiteY2" fmla="*/ 5348178 h 6666615"/>
+                <a:gd name="connsiteX3" fmla="*/ 1537029 w 2673450"/>
+                <a:gd name="connsiteY3" fmla="*/ 6347637 h 6666615"/>
+                <a:gd name="connsiteX4" fmla="*/ 2673450 w 2673450"/>
+                <a:gd name="connsiteY4" fmla="*/ 6666615 h 6666615"/>
+                <a:gd name="connsiteX0" fmla="*/ 0 w 2673450"/>
+                <a:gd name="connsiteY0" fmla="*/ 0 h 6666615"/>
+                <a:gd name="connsiteX1" fmla="*/ 16351 w 2673450"/>
+                <a:gd name="connsiteY1" fmla="*/ 5348176 h 6666615"/>
+                <a:gd name="connsiteX2" fmla="*/ 1535627 w 2673450"/>
+                <a:gd name="connsiteY2" fmla="*/ 5348178 h 6666615"/>
+                <a:gd name="connsiteX3" fmla="*/ 1537029 w 2673450"/>
+                <a:gd name="connsiteY3" fmla="*/ 6347637 h 6666615"/>
+                <a:gd name="connsiteX4" fmla="*/ 2673450 w 2673450"/>
+                <a:gd name="connsiteY4" fmla="*/ 6666615 h 6666615"/>
+                <a:gd name="connsiteX0" fmla="*/ 236019 w 2909469"/>
+                <a:gd name="connsiteY0" fmla="*/ 0 h 6666615"/>
+                <a:gd name="connsiteX1" fmla="*/ 252370 w 2909469"/>
+                <a:gd name="connsiteY1" fmla="*/ 5348176 h 6666615"/>
+                <a:gd name="connsiteX2" fmla="*/ 1771646 w 2909469"/>
+                <a:gd name="connsiteY2" fmla="*/ 5348178 h 6666615"/>
+                <a:gd name="connsiteX3" fmla="*/ 1773048 w 2909469"/>
+                <a:gd name="connsiteY3" fmla="*/ 6347637 h 6666615"/>
+                <a:gd name="connsiteX4" fmla="*/ 2909469 w 2909469"/>
+                <a:gd name="connsiteY4" fmla="*/ 6666615 h 6666615"/>
+                <a:gd name="connsiteX0" fmla="*/ 0 w 2673450"/>
+                <a:gd name="connsiteY0" fmla="*/ 0 h 6666615"/>
+                <a:gd name="connsiteX1" fmla="*/ 16351 w 2673450"/>
+                <a:gd name="connsiteY1" fmla="*/ 5348176 h 6666615"/>
+                <a:gd name="connsiteX2" fmla="*/ 1535627 w 2673450"/>
+                <a:gd name="connsiteY2" fmla="*/ 5348178 h 6666615"/>
+                <a:gd name="connsiteX3" fmla="*/ 1537029 w 2673450"/>
+                <a:gd name="connsiteY3" fmla="*/ 6347637 h 6666615"/>
+                <a:gd name="connsiteX4" fmla="*/ 2673450 w 2673450"/>
+                <a:gd name="connsiteY4" fmla="*/ 6666615 h 6666615"/>
+                <a:gd name="connsiteX0" fmla="*/ 0 w 2673450"/>
+                <a:gd name="connsiteY0" fmla="*/ 0 h 6666615"/>
+                <a:gd name="connsiteX1" fmla="*/ 16351 w 2673450"/>
+                <a:gd name="connsiteY1" fmla="*/ 5348176 h 6666615"/>
+                <a:gd name="connsiteX2" fmla="*/ 1535627 w 2673450"/>
+                <a:gd name="connsiteY2" fmla="*/ 5348178 h 6666615"/>
+                <a:gd name="connsiteX3" fmla="*/ 1537029 w 2673450"/>
+                <a:gd name="connsiteY3" fmla="*/ 6347637 h 6666615"/>
+                <a:gd name="connsiteX4" fmla="*/ 2673450 w 2673450"/>
+                <a:gd name="connsiteY4" fmla="*/ 6666615 h 6666615"/>
+                <a:gd name="connsiteX0" fmla="*/ 0 w 2673450"/>
+                <a:gd name="connsiteY0" fmla="*/ 0 h 6666615"/>
+                <a:gd name="connsiteX1" fmla="*/ 16351 w 2673450"/>
+                <a:gd name="connsiteY1" fmla="*/ 5348176 h 6666615"/>
+                <a:gd name="connsiteX2" fmla="*/ 1535627 w 2673450"/>
+                <a:gd name="connsiteY2" fmla="*/ 5348178 h 6666615"/>
+                <a:gd name="connsiteX3" fmla="*/ 1537029 w 2673450"/>
+                <a:gd name="connsiteY3" fmla="*/ 6347637 h 6666615"/>
+                <a:gd name="connsiteX4" fmla="*/ 2673450 w 2673450"/>
+                <a:gd name="connsiteY4" fmla="*/ 6666615 h 6666615"/>
+                <a:gd name="connsiteX0" fmla="*/ 0 w 2673450"/>
+                <a:gd name="connsiteY0" fmla="*/ 0 h 6666615"/>
+                <a:gd name="connsiteX1" fmla="*/ 16351 w 2673450"/>
+                <a:gd name="connsiteY1" fmla="*/ 5348176 h 6666615"/>
+                <a:gd name="connsiteX2" fmla="*/ 1535627 w 2673450"/>
+                <a:gd name="connsiteY2" fmla="*/ 5348178 h 6666615"/>
+                <a:gd name="connsiteX3" fmla="*/ 1537029 w 2673450"/>
+                <a:gd name="connsiteY3" fmla="*/ 6347637 h 6666615"/>
+                <a:gd name="connsiteX4" fmla="*/ 2673450 w 2673450"/>
+                <a:gd name="connsiteY4" fmla="*/ 6666615 h 6666615"/>
+                <a:gd name="connsiteX0" fmla="*/ 0 w 2673450"/>
+                <a:gd name="connsiteY0" fmla="*/ 0 h 6666615"/>
+                <a:gd name="connsiteX1" fmla="*/ 16351 w 2673450"/>
+                <a:gd name="connsiteY1" fmla="*/ 5348176 h 6666615"/>
+                <a:gd name="connsiteX2" fmla="*/ 1535627 w 2673450"/>
+                <a:gd name="connsiteY2" fmla="*/ 5348178 h 6666615"/>
+                <a:gd name="connsiteX3" fmla="*/ 1537029 w 2673450"/>
+                <a:gd name="connsiteY3" fmla="*/ 6347637 h 6666615"/>
+                <a:gd name="connsiteX4" fmla="*/ 2673450 w 2673450"/>
+                <a:gd name="connsiteY4" fmla="*/ 6666615 h 6666615"/>
+                <a:gd name="connsiteX0" fmla="*/ 0 w 2673450"/>
+                <a:gd name="connsiteY0" fmla="*/ 0 h 6666615"/>
+                <a:gd name="connsiteX1" fmla="*/ 16351 w 2673450"/>
+                <a:gd name="connsiteY1" fmla="*/ 5348176 h 6666615"/>
+                <a:gd name="connsiteX2" fmla="*/ 1535627 w 2673450"/>
+                <a:gd name="connsiteY2" fmla="*/ 5348178 h 6666615"/>
+                <a:gd name="connsiteX3" fmla="*/ 1537029 w 2673450"/>
+                <a:gd name="connsiteY3" fmla="*/ 6347637 h 6666615"/>
+                <a:gd name="connsiteX4" fmla="*/ 2673450 w 2673450"/>
+                <a:gd name="connsiteY4" fmla="*/ 6666615 h 6666615"/>
+                <a:gd name="connsiteX0" fmla="*/ 0 w 2673450"/>
+                <a:gd name="connsiteY0" fmla="*/ 0 h 6666615"/>
+                <a:gd name="connsiteX1" fmla="*/ 16351 w 2673450"/>
+                <a:gd name="connsiteY1" fmla="*/ 5348176 h 6666615"/>
+                <a:gd name="connsiteX2" fmla="*/ 1535627 w 2673450"/>
+                <a:gd name="connsiteY2" fmla="*/ 5348178 h 6666615"/>
+                <a:gd name="connsiteX3" fmla="*/ 1537029 w 2673450"/>
+                <a:gd name="connsiteY3" fmla="*/ 6347637 h 6666615"/>
+                <a:gd name="connsiteX4" fmla="*/ 2673450 w 2673450"/>
+                <a:gd name="connsiteY4" fmla="*/ 6666615 h 6666615"/>
+                <a:gd name="connsiteX0" fmla="*/ 0 w 2673450"/>
+                <a:gd name="connsiteY0" fmla="*/ 0 h 6666615"/>
+                <a:gd name="connsiteX1" fmla="*/ 16351 w 2673450"/>
+                <a:gd name="connsiteY1" fmla="*/ 5348176 h 6666615"/>
+                <a:gd name="connsiteX2" fmla="*/ 1535627 w 2673450"/>
+                <a:gd name="connsiteY2" fmla="*/ 5348178 h 6666615"/>
+                <a:gd name="connsiteX3" fmla="*/ 1537029 w 2673450"/>
+                <a:gd name="connsiteY3" fmla="*/ 6347637 h 6666615"/>
+                <a:gd name="connsiteX4" fmla="*/ 2673450 w 2673450"/>
+                <a:gd name="connsiteY4" fmla="*/ 6666615 h 6666615"/>
+                <a:gd name="connsiteX0" fmla="*/ 0 w 2673450"/>
+                <a:gd name="connsiteY0" fmla="*/ 0 h 6666615"/>
+                <a:gd name="connsiteX1" fmla="*/ 24527 w 2673450"/>
+                <a:gd name="connsiteY1" fmla="*/ 5252483 h 6666615"/>
+                <a:gd name="connsiteX2" fmla="*/ 1535627 w 2673450"/>
+                <a:gd name="connsiteY2" fmla="*/ 5348178 h 6666615"/>
+                <a:gd name="connsiteX3" fmla="*/ 1537029 w 2673450"/>
+                <a:gd name="connsiteY3" fmla="*/ 6347637 h 6666615"/>
+                <a:gd name="connsiteX4" fmla="*/ 2673450 w 2673450"/>
+                <a:gd name="connsiteY4" fmla="*/ 6666615 h 6666615"/>
+                <a:gd name="connsiteX0" fmla="*/ 0 w 2673450"/>
+                <a:gd name="connsiteY0" fmla="*/ 0 h 6666615"/>
+                <a:gd name="connsiteX1" fmla="*/ 24527 w 2673450"/>
+                <a:gd name="connsiteY1" fmla="*/ 5252483 h 6666615"/>
+                <a:gd name="connsiteX2" fmla="*/ 1543803 w 2673450"/>
+                <a:gd name="connsiteY2" fmla="*/ 5231220 h 6666615"/>
+                <a:gd name="connsiteX3" fmla="*/ 1537029 w 2673450"/>
+                <a:gd name="connsiteY3" fmla="*/ 6347637 h 6666615"/>
+                <a:gd name="connsiteX4" fmla="*/ 2673450 w 2673450"/>
+                <a:gd name="connsiteY4" fmla="*/ 6666615 h 6666615"/>
+                <a:gd name="connsiteX0" fmla="*/ 0 w 2673450"/>
+                <a:gd name="connsiteY0" fmla="*/ 0 h 6666615"/>
+                <a:gd name="connsiteX1" fmla="*/ 24527 w 2673450"/>
+                <a:gd name="connsiteY1" fmla="*/ 5252483 h 6666615"/>
+                <a:gd name="connsiteX2" fmla="*/ 1560154 w 2673450"/>
+                <a:gd name="connsiteY2" fmla="*/ 5252485 h 6666615"/>
+                <a:gd name="connsiteX3" fmla="*/ 1537029 w 2673450"/>
+                <a:gd name="connsiteY3" fmla="*/ 6347637 h 6666615"/>
+                <a:gd name="connsiteX4" fmla="*/ 2673450 w 2673450"/>
+                <a:gd name="connsiteY4" fmla="*/ 6666615 h 6666615"/>
+                <a:gd name="connsiteX0" fmla="*/ 0 w 2673450"/>
+                <a:gd name="connsiteY0" fmla="*/ 0 h 6666615"/>
+                <a:gd name="connsiteX1" fmla="*/ 24527 w 2673450"/>
+                <a:gd name="connsiteY1" fmla="*/ 5252483 h 6666615"/>
+                <a:gd name="connsiteX2" fmla="*/ 1511100 w 2673450"/>
+                <a:gd name="connsiteY2" fmla="*/ 5241853 h 6666615"/>
+                <a:gd name="connsiteX3" fmla="*/ 1537029 w 2673450"/>
+                <a:gd name="connsiteY3" fmla="*/ 6347637 h 6666615"/>
+                <a:gd name="connsiteX4" fmla="*/ 2673450 w 2673450"/>
+                <a:gd name="connsiteY4" fmla="*/ 6666615 h 6666615"/>
+                <a:gd name="connsiteX0" fmla="*/ 0 w 2673450"/>
+                <a:gd name="connsiteY0" fmla="*/ 0 h 6666615"/>
+                <a:gd name="connsiteX1" fmla="*/ 24527 w 2673450"/>
+                <a:gd name="connsiteY1" fmla="*/ 5252483 h 6666615"/>
+                <a:gd name="connsiteX2" fmla="*/ 1551978 w 2673450"/>
+                <a:gd name="connsiteY2" fmla="*/ 5241853 h 6666615"/>
+                <a:gd name="connsiteX3" fmla="*/ 1537029 w 2673450"/>
+                <a:gd name="connsiteY3" fmla="*/ 6347637 h 6666615"/>
+                <a:gd name="connsiteX4" fmla="*/ 2673450 w 2673450"/>
+                <a:gd name="connsiteY4" fmla="*/ 6666615 h 6666615"/>
+                <a:gd name="connsiteX0" fmla="*/ 0 w 2673450"/>
+                <a:gd name="connsiteY0" fmla="*/ 0 h 6666615"/>
+                <a:gd name="connsiteX1" fmla="*/ 24527 w 2673450"/>
+                <a:gd name="connsiteY1" fmla="*/ 5252483 h 6666615"/>
+                <a:gd name="connsiteX2" fmla="*/ 1551978 w 2673450"/>
+                <a:gd name="connsiteY2" fmla="*/ 5241853 h 6666615"/>
+                <a:gd name="connsiteX3" fmla="*/ 1537029 w 2673450"/>
+                <a:gd name="connsiteY3" fmla="*/ 6028660 h 6666615"/>
+                <a:gd name="connsiteX4" fmla="*/ 2673450 w 2673450"/>
+                <a:gd name="connsiteY4" fmla="*/ 6666615 h 6666615"/>
+                <a:gd name="connsiteX0" fmla="*/ 0 w 2673450"/>
+                <a:gd name="connsiteY0" fmla="*/ 0 h 6666615"/>
+                <a:gd name="connsiteX1" fmla="*/ 24527 w 2673450"/>
+                <a:gd name="connsiteY1" fmla="*/ 5252483 h 6666615"/>
+                <a:gd name="connsiteX2" fmla="*/ 1551978 w 2673450"/>
+                <a:gd name="connsiteY2" fmla="*/ 5241853 h 6666615"/>
+                <a:gd name="connsiteX3" fmla="*/ 1553381 w 2673450"/>
+                <a:gd name="connsiteY3" fmla="*/ 6039293 h 6666615"/>
+                <a:gd name="connsiteX4" fmla="*/ 2673450 w 2673450"/>
+                <a:gd name="connsiteY4" fmla="*/ 6666615 h 6666615"/>
+                <a:gd name="connsiteX0" fmla="*/ 0 w 2673450"/>
+                <a:gd name="connsiteY0" fmla="*/ 0 h 6666615"/>
+                <a:gd name="connsiteX1" fmla="*/ 24527 w 2673450"/>
+                <a:gd name="connsiteY1" fmla="*/ 5252483 h 6666615"/>
+                <a:gd name="connsiteX2" fmla="*/ 1551978 w 2673450"/>
+                <a:gd name="connsiteY2" fmla="*/ 5241853 h 6666615"/>
+                <a:gd name="connsiteX3" fmla="*/ 1553381 w 2673450"/>
+                <a:gd name="connsiteY3" fmla="*/ 6039293 h 6666615"/>
+                <a:gd name="connsiteX4" fmla="*/ 2673450 w 2673450"/>
+                <a:gd name="connsiteY4" fmla="*/ 6666615 h 6666615"/>
+                <a:gd name="connsiteX0" fmla="*/ 0 w 2673450"/>
+                <a:gd name="connsiteY0" fmla="*/ 0 h 4954773"/>
+                <a:gd name="connsiteX1" fmla="*/ 24527 w 2673450"/>
+                <a:gd name="connsiteY1" fmla="*/ 3540641 h 4954773"/>
+                <a:gd name="connsiteX2" fmla="*/ 1551978 w 2673450"/>
+                <a:gd name="connsiteY2" fmla="*/ 3530011 h 4954773"/>
+                <a:gd name="connsiteX3" fmla="*/ 1553381 w 2673450"/>
+                <a:gd name="connsiteY3" fmla="*/ 4327451 h 4954773"/>
+                <a:gd name="connsiteX4" fmla="*/ 2673450 w 2673450"/>
+                <a:gd name="connsiteY4" fmla="*/ 4954773 h 4954773"/>
+                <a:gd name="connsiteX0" fmla="*/ 0 w 2657099"/>
+                <a:gd name="connsiteY0" fmla="*/ 0 h 4954773"/>
+                <a:gd name="connsiteX1" fmla="*/ 8176 w 2657099"/>
+                <a:gd name="connsiteY1" fmla="*/ 3540641 h 4954773"/>
+                <a:gd name="connsiteX2" fmla="*/ 1535627 w 2657099"/>
+                <a:gd name="connsiteY2" fmla="*/ 3530011 h 4954773"/>
+                <a:gd name="connsiteX3" fmla="*/ 1537030 w 2657099"/>
+                <a:gd name="connsiteY3" fmla="*/ 4327451 h 4954773"/>
+                <a:gd name="connsiteX4" fmla="*/ 2657099 w 2657099"/>
+                <a:gd name="connsiteY4" fmla="*/ 4954773 h 4954773"/>
               </a:gdLst>
               <a:ahLst/>
               <a:cxnLst>
@@ -3503,23 +3733,25 @@
               </a:cxnLst>
               <a:rect l="l" t="t" r="r" b="b"/>
               <a:pathLst>
-                <a:path w="2673450" h="6666615">
+                <a:path w="2657099" h="4954773">
                   <a:moveTo>
                     <a:pt x="0" y="0"/>
                   </a:moveTo>
+                  <a:cubicBezTo>
+                    <a:pt x="5450" y="1782725"/>
+                    <a:pt x="0" y="866553"/>
+                    <a:pt x="8176" y="3540641"/>
+                  </a:cubicBezTo>
                   <a:lnTo>
-                    <a:pt x="0" y="4805916"/>
-                  </a:lnTo>
-                  <a:lnTo>
-                    <a:pt x="1535627" y="5348178"/>
+                    <a:pt x="1535627" y="3530011"/>
                   </a:lnTo>
                   <a:cubicBezTo>
-                    <a:pt x="1536094" y="5645889"/>
-                    <a:pt x="1536562" y="6049926"/>
-                    <a:pt x="1537029" y="6347637"/>
+                    <a:pt x="1532433" y="3997843"/>
+                    <a:pt x="1536563" y="4029740"/>
+                    <a:pt x="1537030" y="4327451"/>
                   </a:cubicBezTo>
                   <a:lnTo>
-                    <a:pt x="2673450" y="6666615"/>
+                    <a:pt x="2657099" y="4954773"/>
                   </a:lnTo>
                 </a:path>
               </a:pathLst>
@@ -3579,9 +3811,9 @@
             <p:nvPr/>
           </p:nvSpPr>
           <p:spPr>
-            <a:xfrm>
-              <a:off x="6559168" y="2211572"/>
-              <a:ext cx="1233378" cy="5486400"/>
+            <a:xfrm flipH="1">
+              <a:off x="5456337" y="2438714"/>
+              <a:ext cx="913811" cy="3962068"/>
             </a:xfrm>
             <a:custGeom>
               <a:avLst/>
@@ -3760,6 +3992,80 @@
                 <a:gd name="connsiteY4" fmla="*/ 1041991 h 5486400"/>
                 <a:gd name="connsiteX5" fmla="*/ 328888 w 948380"/>
                 <a:gd name="connsiteY5" fmla="*/ 329609 h 5486400"/>
+                <a:gd name="connsiteX0" fmla="*/ 0 w 948380"/>
+                <a:gd name="connsiteY0" fmla="*/ 0 h 5486400"/>
+                <a:gd name="connsiteX1" fmla="*/ 0 w 948380"/>
+                <a:gd name="connsiteY1" fmla="*/ 3912781 h 5486400"/>
+                <a:gd name="connsiteX2" fmla="*/ 587247 w 948380"/>
+                <a:gd name="connsiteY2" fmla="*/ 5475769 h 5486400"/>
+                <a:gd name="connsiteX3" fmla="*/ 940204 w 948380"/>
+                <a:gd name="connsiteY3" fmla="*/ 5486400 h 5486400"/>
+                <a:gd name="connsiteX4" fmla="*/ 948380 w 948380"/>
+                <a:gd name="connsiteY4" fmla="*/ 1041991 h 5486400"/>
+                <a:gd name="connsiteX5" fmla="*/ 328888 w 948380"/>
+                <a:gd name="connsiteY5" fmla="*/ 329609 h 5486400"/>
+                <a:gd name="connsiteX0" fmla="*/ 0 w 948380"/>
+                <a:gd name="connsiteY0" fmla="*/ 0 h 5486400"/>
+                <a:gd name="connsiteX1" fmla="*/ 0 w 948380"/>
+                <a:gd name="connsiteY1" fmla="*/ 3912781 h 5486400"/>
+                <a:gd name="connsiteX2" fmla="*/ 946977 w 948380"/>
+                <a:gd name="connsiteY2" fmla="*/ 3923415 h 5486400"/>
+                <a:gd name="connsiteX3" fmla="*/ 940204 w 948380"/>
+                <a:gd name="connsiteY3" fmla="*/ 5486400 h 5486400"/>
+                <a:gd name="connsiteX4" fmla="*/ 948380 w 948380"/>
+                <a:gd name="connsiteY4" fmla="*/ 1041991 h 5486400"/>
+                <a:gd name="connsiteX5" fmla="*/ 328888 w 948380"/>
+                <a:gd name="connsiteY5" fmla="*/ 329609 h 5486400"/>
+                <a:gd name="connsiteX0" fmla="*/ 0 w 1046543"/>
+                <a:gd name="connsiteY0" fmla="*/ 0 h 3923415"/>
+                <a:gd name="connsiteX1" fmla="*/ 0 w 1046543"/>
+                <a:gd name="connsiteY1" fmla="*/ 3912781 h 3923415"/>
+                <a:gd name="connsiteX2" fmla="*/ 946977 w 1046543"/>
+                <a:gd name="connsiteY2" fmla="*/ 3923415 h 3923415"/>
+                <a:gd name="connsiteX3" fmla="*/ 948380 w 1046543"/>
+                <a:gd name="connsiteY3" fmla="*/ 1041991 h 3923415"/>
+                <a:gd name="connsiteX4" fmla="*/ 328888 w 1046543"/>
+                <a:gd name="connsiteY4" fmla="*/ 329609 h 3923415"/>
+                <a:gd name="connsiteX0" fmla="*/ 0 w 993957"/>
+                <a:gd name="connsiteY0" fmla="*/ 0 h 3923415"/>
+                <a:gd name="connsiteX1" fmla="*/ 0 w 993957"/>
+                <a:gd name="connsiteY1" fmla="*/ 3912781 h 3923415"/>
+                <a:gd name="connsiteX2" fmla="*/ 946977 w 993957"/>
+                <a:gd name="connsiteY2" fmla="*/ 3923415 h 3923415"/>
+                <a:gd name="connsiteX3" fmla="*/ 948380 w 993957"/>
+                <a:gd name="connsiteY3" fmla="*/ 1041991 h 3923415"/>
+                <a:gd name="connsiteX4" fmla="*/ 328888 w 993957"/>
+                <a:gd name="connsiteY4" fmla="*/ 329609 h 3923415"/>
+                <a:gd name="connsiteX0" fmla="*/ 0 w 948380"/>
+                <a:gd name="connsiteY0" fmla="*/ 0 h 3923415"/>
+                <a:gd name="connsiteX1" fmla="*/ 0 w 948380"/>
+                <a:gd name="connsiteY1" fmla="*/ 3912781 h 3923415"/>
+                <a:gd name="connsiteX2" fmla="*/ 946977 w 948380"/>
+                <a:gd name="connsiteY2" fmla="*/ 3923415 h 3923415"/>
+                <a:gd name="connsiteX3" fmla="*/ 948380 w 948380"/>
+                <a:gd name="connsiteY3" fmla="*/ 1041991 h 3923415"/>
+                <a:gd name="connsiteX4" fmla="*/ 328888 w 948380"/>
+                <a:gd name="connsiteY4" fmla="*/ 329609 h 3923415"/>
+                <a:gd name="connsiteX0" fmla="*/ 0 w 948380"/>
+                <a:gd name="connsiteY0" fmla="*/ 0 h 3923415"/>
+                <a:gd name="connsiteX1" fmla="*/ 0 w 948380"/>
+                <a:gd name="connsiteY1" fmla="*/ 3912781 h 3923415"/>
+                <a:gd name="connsiteX2" fmla="*/ 946977 w 948380"/>
+                <a:gd name="connsiteY2" fmla="*/ 3923415 h 3923415"/>
+                <a:gd name="connsiteX3" fmla="*/ 948380 w 948380"/>
+                <a:gd name="connsiteY3" fmla="*/ 1041991 h 3923415"/>
+                <a:gd name="connsiteX4" fmla="*/ 328888 w 948380"/>
+                <a:gd name="connsiteY4" fmla="*/ 180753 h 3923415"/>
+                <a:gd name="connsiteX0" fmla="*/ 0 w 948380"/>
+                <a:gd name="connsiteY0" fmla="*/ 0 h 3923415"/>
+                <a:gd name="connsiteX1" fmla="*/ 0 w 948380"/>
+                <a:gd name="connsiteY1" fmla="*/ 3912781 h 3923415"/>
+                <a:gd name="connsiteX2" fmla="*/ 946977 w 948380"/>
+                <a:gd name="connsiteY2" fmla="*/ 3923415 h 3923415"/>
+                <a:gd name="connsiteX3" fmla="*/ 948380 w 948380"/>
+                <a:gd name="connsiteY3" fmla="*/ 606056 h 3923415"/>
+                <a:gd name="connsiteX4" fmla="*/ 328888 w 948380"/>
+                <a:gd name="connsiteY4" fmla="*/ 180753 h 3923415"/>
               </a:gdLst>
               <a:ahLst/>
               <a:cxnLst>
@@ -3778,32 +4084,26 @@
                 <a:cxn ang="0">
                   <a:pos x="connsiteX4" y="connsiteY4"/>
                 </a:cxn>
-                <a:cxn ang="0">
-                  <a:pos x="connsiteX5" y="connsiteY5"/>
-                </a:cxn>
               </a:cxnLst>
               <a:rect l="l" t="t" r="r" b="b"/>
               <a:pathLst>
-                <a:path w="948380" h="5486400">
+                <a:path w="948380" h="3923415">
                   <a:moveTo>
                     <a:pt x="0" y="0"/>
                   </a:moveTo>
                   <a:lnTo>
-                    <a:pt x="0" y="4805916"/>
+                    <a:pt x="0" y="3912781"/>
                   </a:lnTo>
                   <a:lnTo>
-                    <a:pt x="587247" y="5475769"/>
-                  </a:lnTo>
-                  <a:lnTo>
-                    <a:pt x="940204" y="5486400"/>
+                    <a:pt x="946977" y="3923415"/>
                   </a:lnTo>
                   <a:cubicBezTo>
-                    <a:pt x="945654" y="4214037"/>
-                    <a:pt x="942930" y="2314354"/>
-                    <a:pt x="948380" y="1041991"/>
+                    <a:pt x="947678" y="2482703"/>
+                    <a:pt x="947678" y="2046768"/>
+                    <a:pt x="948380" y="606056"/>
                   </a:cubicBezTo>
                   <a:lnTo>
-                    <a:pt x="328888" y="329609"/>
+                    <a:pt x="328888" y="180753"/>
                   </a:lnTo>
                 </a:path>
               </a:pathLst>
@@ -3850,121 +4150,6 @@
             </a:p>
           </p:txBody>
         </p:sp>
-        <p:grpSp>
-          <p:nvGrpSpPr>
-            <p:cNvPr id="38" name="Group 37">
-              <a:extLst>
-                <a:ext uri="{FF2B5EF4-FFF2-40B4-BE49-F238E27FC236}">
-                  <a16:creationId xmlns:a16="http://schemas.microsoft.com/office/drawing/2014/main" id="{7B015F35-8BD0-44B3-BB58-F2A442BB9497}"/>
-                </a:ext>
-              </a:extLst>
-            </p:cNvPr>
-            <p:cNvGrpSpPr/>
-            <p:nvPr/>
-          </p:nvGrpSpPr>
-          <p:grpSpPr>
-            <a:xfrm>
-              <a:off x="6690565" y="7122660"/>
-              <a:ext cx="1294393" cy="711478"/>
-              <a:chOff x="939798" y="2396952"/>
-              <a:chExt cx="1294393" cy="711478"/>
-            </a:xfrm>
-          </p:grpSpPr>
-          <p:sp>
-            <p:nvSpPr>
-              <p:cNvPr id="39" name="Rectangle 38">
-                <a:extLst>
-                  <a:ext uri="{FF2B5EF4-FFF2-40B4-BE49-F238E27FC236}">
-                    <a16:creationId xmlns:a16="http://schemas.microsoft.com/office/drawing/2014/main" id="{C3662BB1-2E31-427D-9110-C4E04D5030D5}"/>
-                  </a:ext>
-                </a:extLst>
-              </p:cNvPr>
-              <p:cNvSpPr/>
-              <p:nvPr/>
-            </p:nvSpPr>
-            <p:spPr>
-              <a:xfrm>
-                <a:off x="1288292" y="2720117"/>
-                <a:ext cx="597404" cy="388313"/>
-              </a:xfrm>
-              <a:prstGeom prst="rect">
-                <a:avLst/>
-              </a:prstGeom>
-              <a:solidFill>
-                <a:schemeClr val="accent4">
-                  <a:lumMod val="75000"/>
-                </a:schemeClr>
-              </a:solidFill>
-            </p:spPr>
-            <p:style>
-              <a:lnRef idx="2">
-                <a:schemeClr val="accent1">
-                  <a:shade val="50000"/>
-                </a:schemeClr>
-              </a:lnRef>
-              <a:fillRef idx="1">
-                <a:schemeClr val="accent1"/>
-              </a:fillRef>
-              <a:effectRef idx="0">
-                <a:schemeClr val="accent1"/>
-              </a:effectRef>
-              <a:fontRef idx="minor">
-                <a:schemeClr val="lt1"/>
-              </a:fontRef>
-            </p:style>
-            <p:txBody>
-              <a:bodyPr rot="0" spcFirstLastPara="0" vertOverflow="overflow" horzOverflow="overflow" vert="horz" wrap="square" lIns="91440" tIns="45720" rIns="91440" bIns="45720" numCol="1" spcCol="0" rtlCol="0" fromWordArt="0" anchor="ctr" anchorCtr="0" forceAA="0" compatLnSpc="1">
-                <a:prstTxWarp prst="textNoShape">
-                  <a:avLst/>
-                </a:prstTxWarp>
-                <a:noAutofit/>
-              </a:bodyPr>
-              <a:lstStyle/>
-              <a:p>
-                <a:pPr algn="ctr"/>
-                <a:endParaRPr lang="en-US"/>
-              </a:p>
-            </p:txBody>
-          </p:sp>
-          <p:sp>
-            <p:nvSpPr>
-              <p:cNvPr id="40" name="TextBox 39">
-                <a:extLst>
-                  <a:ext uri="{FF2B5EF4-FFF2-40B4-BE49-F238E27FC236}">
-                    <a16:creationId xmlns:a16="http://schemas.microsoft.com/office/drawing/2014/main" id="{2008EA9E-C095-4B78-825F-E676920E3B0B}"/>
-                  </a:ext>
-                </a:extLst>
-              </p:cNvPr>
-              <p:cNvSpPr txBox="1">
-                <a:spLocks noChangeAspect="1"/>
-              </p:cNvSpPr>
-              <p:nvPr/>
-            </p:nvSpPr>
-            <p:spPr>
-              <a:xfrm>
-                <a:off x="939798" y="2396952"/>
-                <a:ext cx="1294393" cy="323165"/>
-              </a:xfrm>
-              <a:prstGeom prst="rect">
-                <a:avLst/>
-              </a:prstGeom>
-              <a:noFill/>
-            </p:spPr>
-            <p:txBody>
-              <a:bodyPr wrap="none" tIns="0" rtlCol="0" anchor="ctr" anchorCtr="1">
-                <a:noAutofit/>
-              </a:bodyPr>
-              <a:lstStyle/>
-              <a:p>
-                <a:r>
-                  <a:rPr lang="de-DE" sz="1100" dirty="0" err="1"/>
-                  <a:t>state.yaml</a:t>
-                </a:r>
-                <a:endParaRPr lang="en-US" sz="1100" dirty="0"/>
-              </a:p>
-            </p:txBody>
-          </p:sp>
-        </p:grpSp>
         <p:sp>
           <p:nvSpPr>
             <p:cNvPr id="103" name="Freeform: Shape 102">
@@ -3979,8 +4164,8 @@
           </p:nvSpPr>
           <p:spPr>
             <a:xfrm>
-              <a:off x="6070073" y="2211572"/>
-              <a:ext cx="489097" cy="6092456"/>
+              <a:off x="6367777" y="2211572"/>
+              <a:ext cx="0" cy="4805916"/>
             </a:xfrm>
             <a:custGeom>
               <a:avLst/>
@@ -4003,6 +4188,10 @@
                 <a:gd name="connsiteY1" fmla="*/ 4805916 h 6092456"/>
                 <a:gd name="connsiteX2" fmla="*/ 0 w 489097"/>
                 <a:gd name="connsiteY2" fmla="*/ 6092456 h 6092456"/>
+                <a:gd name="connsiteX0" fmla="*/ 0 w 0"/>
+                <a:gd name="connsiteY0" fmla="*/ 0 h 4805916"/>
+                <a:gd name="connsiteX1" fmla="*/ 0 w 0"/>
+                <a:gd name="connsiteY1" fmla="*/ 4805916 h 4805916"/>
               </a:gdLst>
               <a:ahLst/>
               <a:cxnLst>
@@ -4012,21 +4201,15 @@
                 <a:cxn ang="0">
                   <a:pos x="connsiteX1" y="connsiteY1"/>
                 </a:cxn>
-                <a:cxn ang="0">
-                  <a:pos x="connsiteX2" y="connsiteY2"/>
-                </a:cxn>
               </a:cxnLst>
               <a:rect l="l" t="t" r="r" b="b"/>
               <a:pathLst>
-                <a:path w="489097" h="6092456">
+                <a:path h="4805916">
                   <a:moveTo>
-                    <a:pt x="489097" y="0"/>
+                    <a:pt x="0" y="0"/>
                   </a:moveTo>
                   <a:lnTo>
-                    <a:pt x="489097" y="4805916"/>
-                  </a:lnTo>
-                  <a:lnTo>
-                    <a:pt x="0" y="6092456"/>
+                    <a:pt x="0" y="4805916"/>
                   </a:lnTo>
                 </a:path>
               </a:pathLst>
@@ -4379,7 +4562,7 @@
           </p:nvGrpSpPr>
           <p:grpSpPr>
             <a:xfrm>
-              <a:off x="5913321" y="5876076"/>
+              <a:off x="5498661" y="5876076"/>
               <a:ext cx="1294393" cy="711478"/>
               <a:chOff x="939798" y="2396952"/>
               <a:chExt cx="1294393" cy="711478"/>
@@ -4607,10 +4790,10 @@
           </p:nvGrpSpPr>
           <p:grpSpPr>
             <a:xfrm>
-              <a:off x="5295342" y="8384827"/>
-              <a:ext cx="1294393" cy="711478"/>
-              <a:chOff x="939798" y="2396952"/>
-              <a:chExt cx="1294393" cy="711478"/>
+              <a:off x="5858883" y="7261964"/>
+              <a:ext cx="1294393" cy="723029"/>
+              <a:chOff x="939798" y="2720117"/>
+              <a:chExt cx="1294393" cy="723029"/>
             </a:xfrm>
           </p:grpSpPr>
           <p:sp>
@@ -4681,7 +4864,7 @@
             </p:nvSpPr>
             <p:spPr>
               <a:xfrm>
-                <a:off x="939798" y="2396952"/>
+                <a:off x="939798" y="3119981"/>
                 <a:ext cx="1294393" cy="323165"/>
               </a:xfrm>
               <a:prstGeom prst="rect">
@@ -4718,7 +4901,7 @@
           </p:nvGrpSpPr>
           <p:grpSpPr>
             <a:xfrm>
-              <a:off x="5937440" y="1709715"/>
+              <a:off x="5703514" y="1709715"/>
               <a:ext cx="1294393" cy="711478"/>
               <a:chOff x="939798" y="2396952"/>
               <a:chExt cx="1294393" cy="711478"/>
@@ -4947,7 +5130,7 @@
           </p:nvGrpSpPr>
           <p:grpSpPr>
             <a:xfrm>
-              <a:off x="7912059" y="7122660"/>
+              <a:off x="7912059" y="6941894"/>
               <a:ext cx="1294393" cy="711478"/>
               <a:chOff x="939798" y="2396952"/>
               <a:chExt cx="1294393" cy="711478"/>
@@ -5062,7 +5245,7 @@
           </p:nvGrpSpPr>
           <p:grpSpPr>
             <a:xfrm>
-              <a:off x="9831789" y="8384827"/>
+              <a:off x="9831789" y="8384836"/>
               <a:ext cx="1294393" cy="711478"/>
               <a:chOff x="939798" y="2396952"/>
               <a:chExt cx="1294393" cy="711478"/>
@@ -5820,7 +6003,7 @@
           </p:nvGrpSpPr>
           <p:grpSpPr>
             <a:xfrm>
-              <a:off x="4968205" y="9646361"/>
+              <a:off x="5531746" y="9614476"/>
               <a:ext cx="793872" cy="388313"/>
               <a:chOff x="2383793" y="5802308"/>
               <a:chExt cx="1124214" cy="549896"/>
@@ -5946,7 +6129,7 @@
           </p:nvGrpSpPr>
           <p:grpSpPr>
             <a:xfrm>
-              <a:off x="6073461" y="9662312"/>
+              <a:off x="6637002" y="9630427"/>
               <a:ext cx="793872" cy="388313"/>
               <a:chOff x="2383793" y="5802308"/>
               <a:chExt cx="1124214" cy="549896"/>
@@ -6072,7 +6255,7 @@
           </p:nvSpPr>
           <p:spPr>
             <a:xfrm>
-              <a:off x="5699722" y="9595642"/>
+              <a:off x="6273880" y="9595642"/>
               <a:ext cx="473206" cy="369332"/>
             </a:xfrm>
             <a:prstGeom prst="rect">
@@ -6111,8 +6294,8 @@
           </p:nvCxnSpPr>
           <p:spPr>
             <a:xfrm flipH="1">
-              <a:off x="5365139" y="9096305"/>
-              <a:ext cx="577399" cy="550054"/>
+              <a:off x="5928678" y="7650277"/>
+              <a:ext cx="577401" cy="1964199"/>
             </a:xfrm>
             <a:prstGeom prst="straightConnector1">
               <a:avLst/>
@@ -6153,8 +6336,8 @@
           </p:nvCxnSpPr>
           <p:spPr>
             <a:xfrm>
-              <a:off x="5942538" y="9096307"/>
-              <a:ext cx="527857" cy="566005"/>
+              <a:off x="6506079" y="7650277"/>
+              <a:ext cx="527855" cy="1980150"/>
             </a:xfrm>
             <a:prstGeom prst="straightConnector1">
               <a:avLst/>
@@ -6192,7 +6375,7 @@
           </p:nvSpPr>
           <p:spPr>
             <a:xfrm>
-              <a:off x="5546440" y="9221041"/>
+              <a:off x="6099153" y="9008234"/>
               <a:ext cx="753988" cy="523220"/>
             </a:xfrm>
             <a:prstGeom prst="rect">
@@ -6281,8 +6464,8 @@
             <p:nvPr/>
           </p:nvSpPr>
           <p:spPr>
-            <a:xfrm rot="1259939">
-              <a:off x="5863295" y="8203122"/>
+            <a:xfrm>
+              <a:off x="6172408" y="7033197"/>
               <a:ext cx="388040" cy="245352"/>
             </a:xfrm>
             <a:prstGeom prst="downArrow">
@@ -6341,8 +6524,8 @@
             <p:nvPr/>
           </p:nvSpPr>
           <p:spPr>
-            <a:xfrm rot="7888529">
-              <a:off x="6756738" y="2374329"/>
+            <a:xfrm rot="14362759">
+              <a:off x="5937738" y="2438499"/>
               <a:ext cx="388040" cy="245352"/>
             </a:xfrm>
             <a:prstGeom prst="downArrow">
@@ -6401,8 +6584,8 @@
             <p:nvPr/>
           </p:nvSpPr>
           <p:spPr>
-            <a:xfrm rot="17115485">
-              <a:off x="9864996" y="8768307"/>
+            <a:xfrm rot="17558114">
+              <a:off x="9864996" y="8768316"/>
               <a:ext cx="388040" cy="245352"/>
             </a:xfrm>
             <a:prstGeom prst="downArrow">
@@ -6678,10 +6861,10 @@
           </p:nvGrpSpPr>
           <p:grpSpPr>
             <a:xfrm>
-              <a:off x="7480475" y="2423535"/>
-              <a:ext cx="323165" cy="369332"/>
-              <a:chOff x="7743648" y="4429479"/>
-              <a:chExt cx="323165" cy="369332"/>
+              <a:off x="4944688" y="5673235"/>
+              <a:ext cx="452368" cy="369332"/>
+              <a:chOff x="7686903" y="4429479"/>
+              <a:chExt cx="452368" cy="369332"/>
             </a:xfrm>
           </p:grpSpPr>
           <p:sp>
@@ -6698,8 +6881,8 @@
             </p:nvSpPr>
             <p:spPr>
               <a:xfrm>
-                <a:off x="7750701" y="4429479"/>
-                <a:ext cx="316112" cy="369332"/>
+                <a:off x="7686903" y="4429479"/>
+                <a:ext cx="452368" cy="369332"/>
               </a:xfrm>
               <a:prstGeom prst="rect">
                 <a:avLst/>
@@ -6715,7 +6898,7 @@
                   <a:rPr lang="de-DE" dirty="0">
                     <a:latin typeface="Bauhaus 93" panose="04030905020B02020C02" pitchFamily="82" charset="0"/>
                   </a:rPr>
-                  <a:t>3</a:t>
+                  <a:t>4a</a:t>
                 </a:r>
                 <a:endParaRPr lang="en-US" dirty="0"/>
               </a:p>
@@ -7139,7 +7322,7 @@
           </p:nvGrpSpPr>
           <p:grpSpPr>
             <a:xfrm>
-              <a:off x="3639174" y="1102920"/>
+              <a:off x="3639174" y="1028489"/>
               <a:ext cx="323165" cy="369332"/>
               <a:chOff x="7743648" y="4429479"/>
               <a:chExt cx="323165" cy="369332"/>
@@ -7646,10 +7829,10 @@
           </p:nvGrpSpPr>
           <p:grpSpPr>
             <a:xfrm>
-              <a:off x="5870989" y="7270649"/>
-              <a:ext cx="323165" cy="369332"/>
-              <a:chOff x="7743648" y="4429479"/>
-              <a:chExt cx="323165" cy="369332"/>
+              <a:off x="5739611" y="6687406"/>
+              <a:ext cx="449162" cy="369332"/>
+              <a:chOff x="7697536" y="4429479"/>
+              <a:chExt cx="449162" cy="369332"/>
             </a:xfrm>
           </p:grpSpPr>
           <p:sp>
@@ -7666,8 +7849,8 @@
             </p:nvSpPr>
             <p:spPr>
               <a:xfrm>
-                <a:off x="7750701" y="4429479"/>
-                <a:ext cx="316112" cy="369332"/>
+                <a:off x="7697536" y="4429479"/>
+                <a:ext cx="449162" cy="369332"/>
               </a:xfrm>
               <a:prstGeom prst="rect">
                 <a:avLst/>
@@ -7683,7 +7866,7 @@
                   <a:rPr lang="de-DE" dirty="0">
                     <a:latin typeface="Bauhaus 93" panose="04030905020B02020C02" pitchFamily="82" charset="0"/>
                   </a:rPr>
-                  <a:t>4</a:t>
+                  <a:t>4b</a:t>
                 </a:r>
                 <a:endParaRPr lang="en-US" dirty="0"/>
               </a:p>
@@ -7761,7 +7944,7 @@
           </p:nvGrpSpPr>
           <p:grpSpPr>
             <a:xfrm>
-              <a:off x="6445932" y="9095317"/>
+              <a:off x="6326247" y="8764405"/>
               <a:ext cx="323165" cy="369332"/>
               <a:chOff x="7743648" y="4429479"/>
               <a:chExt cx="323165" cy="369332"/>
@@ -7876,7 +8059,7 @@
           </p:nvSpPr>
           <p:spPr>
             <a:xfrm>
-              <a:off x="5619354" y="10067380"/>
+              <a:off x="6193512" y="10067380"/>
               <a:ext cx="517374" cy="688617"/>
             </a:xfrm>
             <a:prstGeom prst="downArrow">
@@ -7935,7 +8118,7 @@
           </p:nvSpPr>
           <p:spPr>
             <a:xfrm>
-              <a:off x="5289191" y="10763577"/>
+              <a:off x="5863349" y="10763577"/>
               <a:ext cx="1156740" cy="933076"/>
             </a:xfrm>
             <a:prstGeom prst="flowChartMultidocument">
@@ -7989,7 +8172,7 @@
           </p:nvSpPr>
           <p:spPr>
             <a:xfrm>
-              <a:off x="5247726" y="11005515"/>
+              <a:off x="5821884" y="11005515"/>
               <a:ext cx="1066894" cy="523220"/>
             </a:xfrm>
             <a:prstGeom prst="rect">
@@ -8034,7 +8217,7 @@
           </p:nvGrpSpPr>
           <p:grpSpPr>
             <a:xfrm>
-              <a:off x="7887596" y="5700392"/>
+              <a:off x="9174606" y="8076207"/>
               <a:ext cx="323165" cy="369332"/>
               <a:chOff x="7743648" y="4429479"/>
               <a:chExt cx="323165" cy="369332"/>
@@ -8135,121 +8318,6 @@
             </p:txBody>
           </p:sp>
         </p:grpSp>
-        <p:grpSp>
-          <p:nvGrpSpPr>
-            <p:cNvPr id="173" name="Group 172">
-              <a:extLst>
-                <a:ext uri="{FF2B5EF4-FFF2-40B4-BE49-F238E27FC236}">
-                  <a16:creationId xmlns:a16="http://schemas.microsoft.com/office/drawing/2014/main" id="{D19DDC9F-F77A-4B73-80B6-6F235E3263B9}"/>
-                </a:ext>
-              </a:extLst>
-            </p:cNvPr>
-            <p:cNvGrpSpPr/>
-            <p:nvPr/>
-          </p:nvGrpSpPr>
-          <p:grpSpPr>
-            <a:xfrm>
-              <a:off x="8667724" y="7987746"/>
-              <a:ext cx="323165" cy="369332"/>
-              <a:chOff x="7743648" y="4429479"/>
-              <a:chExt cx="323165" cy="369332"/>
-            </a:xfrm>
-          </p:grpSpPr>
-          <p:sp>
-            <p:nvSpPr>
-              <p:cNvPr id="174" name="Rectangle 173">
-                <a:extLst>
-                  <a:ext uri="{FF2B5EF4-FFF2-40B4-BE49-F238E27FC236}">
-                    <a16:creationId xmlns:a16="http://schemas.microsoft.com/office/drawing/2014/main" id="{2A598E7B-5448-40DA-98F7-0DA5DAD5B17D}"/>
-                  </a:ext>
-                </a:extLst>
-              </p:cNvPr>
-              <p:cNvSpPr/>
-              <p:nvPr/>
-            </p:nvSpPr>
-            <p:spPr>
-              <a:xfrm>
-                <a:off x="7750701" y="4429479"/>
-                <a:ext cx="316112" cy="369332"/>
-              </a:xfrm>
-              <a:prstGeom prst="rect">
-                <a:avLst/>
-              </a:prstGeom>
-            </p:spPr>
-            <p:txBody>
-              <a:bodyPr wrap="none">
-                <a:spAutoFit/>
-              </a:bodyPr>
-              <a:lstStyle/>
-              <a:p>
-                <a:r>
-                  <a:rPr lang="de-DE" dirty="0">
-                    <a:latin typeface="Bauhaus 93" panose="04030905020B02020C02" pitchFamily="82" charset="0"/>
-                  </a:rPr>
-                  <a:t>7</a:t>
-                </a:r>
-                <a:endParaRPr lang="en-US" dirty="0"/>
-              </a:p>
-            </p:txBody>
-          </p:sp>
-          <p:sp>
-            <p:nvSpPr>
-              <p:cNvPr id="175" name="Oval 174">
-                <a:extLst>
-                  <a:ext uri="{FF2B5EF4-FFF2-40B4-BE49-F238E27FC236}">
-                    <a16:creationId xmlns:a16="http://schemas.microsoft.com/office/drawing/2014/main" id="{EFDA2AC1-BB40-4A29-A8BC-70076F8585B0}"/>
-                  </a:ext>
-                </a:extLst>
-              </p:cNvPr>
-              <p:cNvSpPr/>
-              <p:nvPr/>
-            </p:nvSpPr>
-            <p:spPr>
-              <a:xfrm>
-                <a:off x="7743648" y="4441930"/>
-                <a:ext cx="323165" cy="323165"/>
-              </a:xfrm>
-              <a:prstGeom prst="ellipse">
-                <a:avLst/>
-              </a:prstGeom>
-              <a:noFill/>
-              <a:ln w="31750">
-                <a:solidFill>
-                  <a:schemeClr val="tx1"/>
-                </a:solidFill>
-              </a:ln>
-            </p:spPr>
-            <p:style>
-              <a:lnRef idx="2">
-                <a:schemeClr val="accent1">
-                  <a:shade val="50000"/>
-                </a:schemeClr>
-              </a:lnRef>
-              <a:fillRef idx="1">
-                <a:schemeClr val="accent1"/>
-              </a:fillRef>
-              <a:effectRef idx="0">
-                <a:schemeClr val="accent1"/>
-              </a:effectRef>
-              <a:fontRef idx="minor">
-                <a:schemeClr val="lt1"/>
-              </a:fontRef>
-            </p:style>
-            <p:txBody>
-              <a:bodyPr rot="0" spcFirstLastPara="0" vertOverflow="overflow" horzOverflow="overflow" vert="horz" wrap="square" lIns="91440" tIns="45720" rIns="91440" bIns="45720" numCol="1" spcCol="0" rtlCol="0" fromWordArt="0" anchor="ctr" anchorCtr="0" forceAA="0" compatLnSpc="1">
-                <a:prstTxWarp prst="textNoShape">
-                  <a:avLst/>
-                </a:prstTxWarp>
-                <a:noAutofit/>
-              </a:bodyPr>
-              <a:lstStyle/>
-              <a:p>
-                <a:pPr algn="ctr"/>
-                <a:endParaRPr lang="en-US"/>
-              </a:p>
-            </p:txBody>
-          </p:sp>
-        </p:grpSp>
         <p:cxnSp>
           <p:nvCxnSpPr>
             <p:cNvPr id="178" name="Straight Connector 177">
@@ -8268,8 +8336,8 @@
           </p:nvCxnSpPr>
           <p:spPr>
             <a:xfrm flipV="1">
-              <a:off x="10777687" y="6170422"/>
-              <a:ext cx="1780196" cy="2731727"/>
+              <a:off x="10777687" y="8116179"/>
+              <a:ext cx="1780196" cy="785979"/>
             </a:xfrm>
             <a:prstGeom prst="line">
               <a:avLst/>
@@ -8343,7 +8411,7 @@
           </p:nvSpPr>
           <p:spPr>
             <a:xfrm>
-              <a:off x="12557883" y="5635717"/>
+              <a:off x="12557883" y="7581474"/>
               <a:ext cx="1551624" cy="1069410"/>
             </a:xfrm>
             <a:prstGeom prst="roundRect">
@@ -8402,7 +8470,7 @@
           </p:nvSpPr>
           <p:spPr>
             <a:xfrm>
-              <a:off x="12557883" y="7080266"/>
+              <a:off x="12557883" y="9026023"/>
               <a:ext cx="1551624" cy="1069410"/>
             </a:xfrm>
             <a:prstGeom prst="roundRect">
@@ -8458,14 +8526,15 @@
             </p:cNvPr>
             <p:cNvCxnSpPr>
               <a:cxnSpLocks/>
+              <a:stCxn id="45" idx="3"/>
               <a:endCxn id="186" idx="1"/>
             </p:cNvCxnSpPr>
             <p:nvPr/>
           </p:nvCxnSpPr>
           <p:spPr>
-            <a:xfrm flipV="1">
-              <a:off x="10803917" y="7614971"/>
-              <a:ext cx="1753966" cy="1287178"/>
+            <a:xfrm>
+              <a:off x="10777687" y="8902158"/>
+              <a:ext cx="1780196" cy="658570"/>
             </a:xfrm>
             <a:prstGeom prst="line">
               <a:avLst/>
@@ -8548,7 +8617,7 @@
           </p:nvSpPr>
           <p:spPr>
             <a:xfrm>
-              <a:off x="12651512" y="4711049"/>
+              <a:off x="12651512" y="6656806"/>
               <a:ext cx="1354025" cy="646331"/>
             </a:xfrm>
             <a:prstGeom prst="rect">
@@ -8759,15 +8828,15 @@
             </p:cNvPr>
             <p:cNvCxnSpPr>
               <a:cxnSpLocks/>
-              <a:stCxn id="87" idx="3"/>
+              <a:stCxn id="86" idx="7"/>
               <a:endCxn id="197" idx="2"/>
             </p:cNvCxnSpPr>
             <p:nvPr/>
           </p:nvCxnSpPr>
           <p:spPr>
             <a:xfrm flipV="1">
-              <a:off x="6867333" y="9051648"/>
-              <a:ext cx="481598" cy="804821"/>
+              <a:off x="7287593" y="9051648"/>
+              <a:ext cx="61338" cy="635646"/>
             </a:xfrm>
             <a:prstGeom prst="straightConnector1">
               <a:avLst/>
@@ -8803,14 +8872,13 @@
             <p:cNvCxnSpPr>
               <a:cxnSpLocks/>
               <a:stCxn id="197" idx="0"/>
-              <a:endCxn id="39" idx="2"/>
             </p:cNvCxnSpPr>
             <p:nvPr/>
           </p:nvCxnSpPr>
           <p:spPr>
-            <a:xfrm flipH="1" flipV="1">
-              <a:off x="7337761" y="7834138"/>
-              <a:ext cx="11170" cy="829197"/>
+            <a:xfrm flipV="1">
+              <a:off x="7348931" y="7661828"/>
+              <a:ext cx="970563" cy="1001507"/>
             </a:xfrm>
             <a:prstGeom prst="line">
               <a:avLst/>
@@ -8849,7 +8917,7 @@
           </p:nvSpPr>
           <p:spPr>
             <a:xfrm>
-              <a:off x="7144350" y="8231663"/>
+              <a:off x="7209977" y="8199318"/>
               <a:ext cx="421910" cy="246221"/>
             </a:xfrm>
             <a:prstGeom prst="rect">
@@ -8986,6 +9054,49 @@
             </p:txBody>
           </p:sp>
         </p:grpSp>
+        <p:cxnSp>
+          <p:nvCxnSpPr>
+            <p:cNvPr id="5" name="Straight Arrow Connector 4">
+              <a:extLst>
+                <a:ext uri="{FF2B5EF4-FFF2-40B4-BE49-F238E27FC236}">
+                  <a16:creationId xmlns:a16="http://schemas.microsoft.com/office/drawing/2014/main" id="{F69FD318-C153-4CBA-A2C1-C823FEAAF36E}"/>
+                </a:ext>
+              </a:extLst>
+            </p:cNvPr>
+            <p:cNvCxnSpPr>
+              <a:stCxn id="84" idx="1"/>
+              <a:endCxn id="80" idx="6"/>
+            </p:cNvCxnSpPr>
+            <p:nvPr/>
+          </p:nvCxnSpPr>
+          <p:spPr>
+            <a:xfrm flipH="1" flipV="1">
+              <a:off x="2001260" y="9569582"/>
+              <a:ext cx="3530486" cy="239051"/>
+            </a:xfrm>
+            <a:prstGeom prst="straightConnector1">
+              <a:avLst/>
+            </a:prstGeom>
+            <a:ln>
+              <a:prstDash val="sysDash"/>
+              <a:tailEnd type="triangle"/>
+            </a:ln>
+          </p:spPr>
+          <p:style>
+            <a:lnRef idx="1">
+              <a:schemeClr val="accent1"/>
+            </a:lnRef>
+            <a:fillRef idx="0">
+              <a:schemeClr val="accent1"/>
+            </a:fillRef>
+            <a:effectRef idx="0">
+              <a:schemeClr val="accent1"/>
+            </a:effectRef>
+            <a:fontRef idx="minor">
+              <a:schemeClr val="tx1"/>
+            </a:fontRef>
+          </p:style>
+        </p:cxnSp>
       </p:grpSp>
     </p:spTree>
     <p:extLst>
@@ -9019,10 +9130,10 @@
       </p:grpSpPr>
       <p:grpSp>
         <p:nvGrpSpPr>
-          <p:cNvPr id="98" name="Group 97">
+          <p:cNvPr id="63" name="Group 62">
             <a:extLst>
               <a:ext uri="{FF2B5EF4-FFF2-40B4-BE49-F238E27FC236}">
-                <a16:creationId xmlns:a16="http://schemas.microsoft.com/office/drawing/2014/main" id="{C8663F4F-FA7A-4245-B937-9030ECEE8B4B}"/>
+                <a16:creationId xmlns:a16="http://schemas.microsoft.com/office/drawing/2014/main" id="{AF739F4D-2E5A-4B93-A271-22958831D577}"/>
               </a:ext>
             </a:extLst>
           </p:cNvPr>
@@ -9978,121 +10089,6 @@
                 <a:r>
                   <a:rPr lang="de-DE" sz="1100" dirty="0" err="1"/>
                   <a:t>component.yaml</a:t>
-                </a:r>
-                <a:endParaRPr lang="en-US" sz="1100" dirty="0"/>
-              </a:p>
-            </p:txBody>
-          </p:sp>
-        </p:grpSp>
-        <p:grpSp>
-          <p:nvGrpSpPr>
-            <p:cNvPr id="24" name="Group 23">
-              <a:extLst>
-                <a:ext uri="{FF2B5EF4-FFF2-40B4-BE49-F238E27FC236}">
-                  <a16:creationId xmlns:a16="http://schemas.microsoft.com/office/drawing/2014/main" id="{46F97672-AB97-45F9-BE4D-A12904EB76BA}"/>
-                </a:ext>
-              </a:extLst>
-            </p:cNvPr>
-            <p:cNvGrpSpPr/>
-            <p:nvPr/>
-          </p:nvGrpSpPr>
-          <p:grpSpPr>
-            <a:xfrm>
-              <a:off x="5609626" y="5026087"/>
-              <a:ext cx="1294393" cy="711478"/>
-              <a:chOff x="939798" y="2396952"/>
-              <a:chExt cx="1294393" cy="711478"/>
-            </a:xfrm>
-          </p:grpSpPr>
-          <p:sp>
-            <p:nvSpPr>
-              <p:cNvPr id="25" name="Rectangle 24">
-                <a:extLst>
-                  <a:ext uri="{FF2B5EF4-FFF2-40B4-BE49-F238E27FC236}">
-                    <a16:creationId xmlns:a16="http://schemas.microsoft.com/office/drawing/2014/main" id="{60B3D31A-FDC4-469B-9CDA-F4F2C065FC8B}"/>
-                  </a:ext>
-                </a:extLst>
-              </p:cNvPr>
-              <p:cNvSpPr/>
-              <p:nvPr/>
-            </p:nvSpPr>
-            <p:spPr>
-              <a:xfrm>
-                <a:off x="1288292" y="2720117"/>
-                <a:ext cx="597404" cy="388313"/>
-              </a:xfrm>
-              <a:prstGeom prst="rect">
-                <a:avLst/>
-              </a:prstGeom>
-              <a:solidFill>
-                <a:schemeClr val="accent4">
-                  <a:lumMod val="75000"/>
-                </a:schemeClr>
-              </a:solidFill>
-            </p:spPr>
-            <p:style>
-              <a:lnRef idx="2">
-                <a:schemeClr val="accent1">
-                  <a:shade val="50000"/>
-                </a:schemeClr>
-              </a:lnRef>
-              <a:fillRef idx="1">
-                <a:schemeClr val="accent1"/>
-              </a:fillRef>
-              <a:effectRef idx="0">
-                <a:schemeClr val="accent1"/>
-              </a:effectRef>
-              <a:fontRef idx="minor">
-                <a:schemeClr val="lt1"/>
-              </a:fontRef>
-            </p:style>
-            <p:txBody>
-              <a:bodyPr rot="0" spcFirstLastPara="0" vertOverflow="overflow" horzOverflow="overflow" vert="horz" wrap="square" lIns="91440" tIns="45720" rIns="91440" bIns="45720" numCol="1" spcCol="0" rtlCol="0" fromWordArt="0" anchor="ctr" anchorCtr="0" forceAA="0" compatLnSpc="1">
-                <a:prstTxWarp prst="textNoShape">
-                  <a:avLst/>
-                </a:prstTxWarp>
-                <a:noAutofit/>
-              </a:bodyPr>
-              <a:lstStyle/>
-              <a:p>
-                <a:pPr algn="ctr"/>
-                <a:endParaRPr lang="en-US"/>
-              </a:p>
-            </p:txBody>
-          </p:sp>
-          <p:sp>
-            <p:nvSpPr>
-              <p:cNvPr id="26" name="TextBox 25">
-                <a:extLst>
-                  <a:ext uri="{FF2B5EF4-FFF2-40B4-BE49-F238E27FC236}">
-                    <a16:creationId xmlns:a16="http://schemas.microsoft.com/office/drawing/2014/main" id="{2A712083-B57D-4DE0-994C-258186698472}"/>
-                  </a:ext>
-                </a:extLst>
-              </p:cNvPr>
-              <p:cNvSpPr txBox="1">
-                <a:spLocks noChangeAspect="1"/>
-              </p:cNvSpPr>
-              <p:nvPr/>
-            </p:nvSpPr>
-            <p:spPr>
-              <a:xfrm>
-                <a:off x="939798" y="2396952"/>
-                <a:ext cx="1294393" cy="323165"/>
-              </a:xfrm>
-              <a:prstGeom prst="rect">
-                <a:avLst/>
-              </a:prstGeom>
-              <a:noFill/>
-            </p:spPr>
-            <p:txBody>
-              <a:bodyPr wrap="none" tIns="0" rtlCol="0" anchor="ctr" anchorCtr="1">
-                <a:noAutofit/>
-              </a:bodyPr>
-              <a:lstStyle/>
-              <a:p>
-                <a:r>
-                  <a:rPr lang="de-DE" sz="1100" dirty="0" err="1"/>
-                  <a:t>state.yaml</a:t>
                 </a:r>
                 <a:endParaRPr lang="en-US" sz="1100" dirty="0"/>
               </a:p>
@@ -11793,6 +11789,47 @@
               <a:ext cx="1020944" cy="1347804"/>
             </a:xfrm>
             <a:prstGeom prst="straightConnector1">
+              <a:avLst/>
+            </a:prstGeom>
+            <a:ln>
+              <a:tailEnd type="triangle"/>
+            </a:ln>
+          </p:spPr>
+          <p:style>
+            <a:lnRef idx="1">
+              <a:schemeClr val="accent1"/>
+            </a:lnRef>
+            <a:fillRef idx="0">
+              <a:schemeClr val="accent1"/>
+            </a:fillRef>
+            <a:effectRef idx="0">
+              <a:schemeClr val="accent1"/>
+            </a:effectRef>
+            <a:fontRef idx="minor">
+              <a:schemeClr val="tx1"/>
+            </a:fontRef>
+          </p:style>
+        </p:cxnSp>
+        <p:cxnSp>
+          <p:nvCxnSpPr>
+            <p:cNvPr id="58" name="Connector: Elbow 57">
+              <a:extLst>
+                <a:ext uri="{FF2B5EF4-FFF2-40B4-BE49-F238E27FC236}">
+                  <a16:creationId xmlns:a16="http://schemas.microsoft.com/office/drawing/2014/main" id="{DA4BDDA4-F054-4EA1-BF8E-0AAF089E5AD9}"/>
+                </a:ext>
+              </a:extLst>
+            </p:cNvPr>
+            <p:cNvCxnSpPr>
+              <a:endCxn id="50" idx="1"/>
+            </p:cNvCxnSpPr>
+            <p:nvPr/>
+          </p:nvCxnSpPr>
+          <p:spPr>
+            <a:xfrm rot="16200000" flipH="1">
+              <a:off x="4516298" y="5594459"/>
+              <a:ext cx="1456094" cy="102784"/>
+            </a:xfrm>
+            <a:prstGeom prst="bentConnector2">
               <a:avLst/>
             </a:prstGeom>
             <a:ln>

</xml_diff>